<commit_message>
mejoras pdfs y codigo de navegacion
</commit_message>
<xml_diff>
--- a/_18_JSF/powerpoint/JSF - 4 - Acciones y Navegacion.pptx
+++ b/_18_JSF/powerpoint/JSF - 4 - Acciones y Navegacion.pptx
@@ -382,7 +382,7 @@
               <a:pPr>
                 <a:defRPr/>
               </a:pPr>
-              <a:t>18/10/2022</a:t>
+              <a:t>31/10/2022</a:t>
             </a:fld>
             <a:endParaRPr lang="es-ES"/>
           </a:p>
@@ -572,7 +572,7 @@
               <a:pPr>
                 <a:defRPr/>
               </a:pPr>
-              <a:t>18/10/2022</a:t>
+              <a:t>31/10/2022</a:t>
             </a:fld>
             <a:endParaRPr lang="es-ES"/>
           </a:p>
@@ -772,7 +772,7 @@
               <a:pPr>
                 <a:defRPr/>
               </a:pPr>
-              <a:t>18/10/2022</a:t>
+              <a:t>31/10/2022</a:t>
             </a:fld>
             <a:endParaRPr lang="es-ES"/>
           </a:p>
@@ -3504,7 +3504,7 @@
               <a:pPr>
                 <a:defRPr/>
               </a:pPr>
-              <a:t>18/10/2022</a:t>
+              <a:t>31/10/2022</a:t>
             </a:fld>
             <a:endParaRPr lang="es-ES"/>
           </a:p>
@@ -6680,7 +6680,7 @@
               <a:pPr>
                 <a:defRPr/>
               </a:pPr>
-              <a:t>18/10/2022</a:t>
+              <a:t>31/10/2022</a:t>
             </a:fld>
             <a:endParaRPr lang="es-ES"/>
           </a:p>
@@ -7411,7 +7411,7 @@
               <a:pPr>
                 <a:defRPr/>
               </a:pPr>
-              <a:t>18/10/2022</a:t>
+              <a:t>31/10/2022</a:t>
             </a:fld>
             <a:endParaRPr lang="es-ES"/>
           </a:p>
@@ -7852,7 +7852,7 @@
               <a:pPr>
                 <a:defRPr/>
               </a:pPr>
-              <a:t>18/10/2022</a:t>
+              <a:t>31/10/2022</a:t>
             </a:fld>
             <a:endParaRPr lang="es-ES"/>
           </a:p>
@@ -7991,7 +7991,7 @@
               <a:pPr>
                 <a:defRPr/>
               </a:pPr>
-              <a:t>18/10/2022</a:t>
+              <a:t>31/10/2022</a:t>
             </a:fld>
             <a:endParaRPr lang="es-ES"/>
           </a:p>
@@ -8108,7 +8108,7 @@
               <a:pPr>
                 <a:defRPr/>
               </a:pPr>
-              <a:t>18/10/2022</a:t>
+              <a:t>31/10/2022</a:t>
             </a:fld>
             <a:endParaRPr lang="es-ES"/>
           </a:p>
@@ -8405,7 +8405,7 @@
               <a:pPr>
                 <a:defRPr/>
               </a:pPr>
-              <a:t>18/10/2022</a:t>
+              <a:t>31/10/2022</a:t>
             </a:fld>
             <a:endParaRPr lang="es-ES"/>
           </a:p>
@@ -8682,7 +8682,7 @@
               <a:pPr>
                 <a:defRPr/>
               </a:pPr>
-              <a:t>18/10/2022</a:t>
+              <a:t>31/10/2022</a:t>
             </a:fld>
             <a:endParaRPr lang="es-ES"/>
           </a:p>
@@ -8938,7 +8938,7 @@
               <a:pPr>
                 <a:defRPr/>
               </a:pPr>
-              <a:t>18/10/2022</a:t>
+              <a:t>31/10/2022</a:t>
             </a:fld>
             <a:endParaRPr lang="es-ES"/>
           </a:p>
@@ -10389,7 +10389,7 @@
               <a:pPr>
                 <a:defRPr/>
               </a:pPr>
-              <a:t>18/10/2022</a:t>
+              <a:t>31/10/2022</a:t>
             </a:fld>
             <a:endParaRPr lang="es-ES"/>
           </a:p>
@@ -11273,45 +11273,53 @@
           <a:lstStyle/>
           <a:p>
             <a:r>
-              <a:rPr lang="es-ES"/>
+              <a:rPr lang="es-ES" dirty="0"/>
               <a:t>Corresponde a la invocación de métodos de los </a:t>
             </a:r>
             <a:r>
-              <a:rPr lang="es-ES" b="1"/>
-              <a:t>Managed Bean</a:t>
-            </a:r>
-            <a:r>
-              <a:rPr lang="es-ES"/>
+              <a:rPr lang="es-ES" b="1" dirty="0" err="1"/>
+              <a:t>Managed</a:t>
+            </a:r>
+            <a:r>
+              <a:rPr lang="es-ES" b="1" dirty="0"/>
+              <a:t> </a:t>
+            </a:r>
+            <a:r>
+              <a:rPr lang="es-ES" b="1" dirty="0" err="1"/>
+              <a:t>Bean</a:t>
+            </a:r>
+            <a:r>
+              <a:rPr lang="es-ES" dirty="0"/>
               <a:t> o a la invocación de una pagina JSF.</a:t>
             </a:r>
           </a:p>
           <a:p>
             <a:r>
-              <a:rPr lang="es-ES"/>
+              <a:rPr lang="es-ES" dirty="0"/>
               <a:t>Se emplea el atributo </a:t>
             </a:r>
             <a:r>
-              <a:rPr lang="es-ES" b="1"/>
+              <a:rPr lang="es-ES" b="1" dirty="0" err="1"/>
               <a:t>action</a:t>
             </a:r>
             <a:r>
-              <a:rPr lang="es-ES"/>
+              <a:rPr lang="es-ES" dirty="0"/>
               <a:t> de las etiquetas </a:t>
             </a:r>
             <a:r>
-              <a:rPr lang="es-ES" b="1"/>
+              <a:rPr lang="es-ES" b="1" dirty="0" err="1"/>
               <a:t>CommandButton</a:t>
             </a:r>
             <a:r>
-              <a:rPr lang="es-ES"/>
+              <a:rPr lang="es-ES" dirty="0"/>
               <a:t> o </a:t>
             </a:r>
             <a:r>
-              <a:rPr lang="es-ES" b="1"/>
+              <a:rPr lang="es-ES" b="1" dirty="0" err="1"/>
               <a:t>CommandLink</a:t>
             </a:r>
             <a:r>
-              <a:rPr lang="es-ES"/>
+              <a:rPr lang="es-ES" dirty="0"/>
               <a:t>.</a:t>
             </a:r>
           </a:p>
@@ -11451,32 +11459,40 @@
           <a:lstStyle/>
           <a:p>
             <a:r>
-              <a:rPr lang="es-ES"/>
+              <a:rPr lang="es-ES" dirty="0"/>
               <a:t>Para la invocación de un método de un </a:t>
             </a:r>
             <a:r>
-              <a:rPr lang="es-ES" b="1"/>
-              <a:t>Managed Bean</a:t>
-            </a:r>
-            <a:r>
-              <a:rPr lang="es-ES"/>
+              <a:rPr lang="es-ES" b="1" dirty="0" err="1"/>
+              <a:t>Managed</a:t>
+            </a:r>
+            <a:r>
+              <a:rPr lang="es-ES" b="1" dirty="0"/>
+              <a:t> </a:t>
+            </a:r>
+            <a:r>
+              <a:rPr lang="es-ES" b="1" dirty="0" err="1"/>
+              <a:t>Bean</a:t>
+            </a:r>
+            <a:r>
+              <a:rPr lang="es-ES" dirty="0"/>
               <a:t>.</a:t>
             </a:r>
           </a:p>
           <a:p>
-            <a:endParaRPr lang="es-ES"/>
-          </a:p>
-          <a:p>
-            <a:r>
-              <a:rPr lang="es-ES"/>
+            <a:endParaRPr lang="es-ES" dirty="0"/>
+          </a:p>
+          <a:p>
+            <a:r>
+              <a:rPr lang="es-ES" dirty="0"/>
               <a:t>El método ha de retorna un </a:t>
             </a:r>
             <a:r>
-              <a:rPr lang="es-ES" b="1"/>
+              <a:rPr lang="es-ES" b="1" dirty="0" err="1"/>
               <a:t>string</a:t>
             </a:r>
             <a:r>
-              <a:rPr lang="es-ES"/>
+              <a:rPr lang="es-ES" dirty="0"/>
               <a:t>, que será interpretado como la pagina JSF que se empleará como vista de salida.</a:t>
             </a:r>
           </a:p>
@@ -11578,14 +11594,74 @@
           <a:p>
             <a:pPr defTabSz="409575" hangingPunct="0"/>
             <a:r>
-              <a:rPr lang="en-US" sz="1400">
+              <a:rPr lang="en-US" sz="1400" dirty="0">
                 <a:solidFill>
                   <a:srgbClr val="000000"/>
                 </a:solidFill>
                 <a:latin typeface="Helvetica Light"/>
                 <a:sym typeface="Helvetica Light"/>
               </a:rPr>
-              <a:t>&lt;h:commandButton value="Entrar" action="#{Login.submit}“ /&gt;</a:t>
+              <a:t>&lt;</a:t>
+            </a:r>
+            <a:r>
+              <a:rPr lang="en-US" sz="1400" dirty="0" err="1">
+                <a:solidFill>
+                  <a:srgbClr val="000000"/>
+                </a:solidFill>
+                <a:latin typeface="Helvetica Light"/>
+                <a:sym typeface="Helvetica Light"/>
+              </a:rPr>
+              <a:t>h:commandButton</a:t>
+            </a:r>
+            <a:r>
+              <a:rPr lang="en-US" sz="1400" dirty="0">
+                <a:solidFill>
+                  <a:srgbClr val="000000"/>
+                </a:solidFill>
+                <a:latin typeface="Helvetica Light"/>
+                <a:sym typeface="Helvetica Light"/>
+              </a:rPr>
+              <a:t> value="</a:t>
+            </a:r>
+            <a:r>
+              <a:rPr lang="en-US" sz="1400" dirty="0" err="1">
+                <a:solidFill>
+                  <a:srgbClr val="000000"/>
+                </a:solidFill>
+                <a:latin typeface="Helvetica Light"/>
+                <a:sym typeface="Helvetica Light"/>
+              </a:rPr>
+              <a:t>Entrar</a:t>
+            </a:r>
+            <a:r>
+              <a:rPr lang="en-US" sz="1400" dirty="0">
+                <a:solidFill>
+                  <a:srgbClr val="000000"/>
+                </a:solidFill>
+                <a:latin typeface="Helvetica Light"/>
+                <a:sym typeface="Helvetica Light"/>
+              </a:rPr>
+              <a:t>" action="#{</a:t>
+            </a:r>
+            <a:r>
+              <a:rPr lang="en-US" sz="1400" dirty="0" err="1">
+                <a:solidFill>
+                  <a:srgbClr val="000000"/>
+                </a:solidFill>
+                <a:latin typeface="Helvetica Light"/>
+                <a:sym typeface="Helvetica Light"/>
+              </a:rPr>
+              <a:t>login.submit</a:t>
+            </a:r>
+            <a:r>
+              <a:rPr lang="en-US" sz="1400" dirty="0">
+                <a:solidFill>
+                  <a:srgbClr val="000000"/>
+                </a:solidFill>
+                <a:latin typeface="Helvetica Light"/>
+                <a:sym typeface="Helvetica Light"/>
+              </a:rPr>
+              <a:t>}“ /&gt;</a:t>
             </a:r>
           </a:p>
         </p:txBody>
@@ -11871,14 +11947,74 @@
           <a:p>
             <a:pPr defTabSz="409575" hangingPunct="0"/>
             <a:r>
-              <a:rPr lang="en-US" sz="1400">
+              <a:rPr lang="en-US" sz="1400" dirty="0">
                 <a:solidFill>
                   <a:srgbClr val="000000"/>
                 </a:solidFill>
                 <a:latin typeface="Helvetica Light"/>
                 <a:sym typeface="Helvetica Light"/>
               </a:rPr>
-              <a:t>&lt;h:commandButton value="Entrar" action="#{Login.submit}“ /&gt;</a:t>
+              <a:t>&lt;</a:t>
+            </a:r>
+            <a:r>
+              <a:rPr lang="en-US" sz="1400" dirty="0" err="1">
+                <a:solidFill>
+                  <a:srgbClr val="000000"/>
+                </a:solidFill>
+                <a:latin typeface="Helvetica Light"/>
+                <a:sym typeface="Helvetica Light"/>
+              </a:rPr>
+              <a:t>h:commandButton</a:t>
+            </a:r>
+            <a:r>
+              <a:rPr lang="en-US" sz="1400" dirty="0">
+                <a:solidFill>
+                  <a:srgbClr val="000000"/>
+                </a:solidFill>
+                <a:latin typeface="Helvetica Light"/>
+                <a:sym typeface="Helvetica Light"/>
+              </a:rPr>
+              <a:t> value="</a:t>
+            </a:r>
+            <a:r>
+              <a:rPr lang="en-US" sz="1400" dirty="0" err="1">
+                <a:solidFill>
+                  <a:srgbClr val="000000"/>
+                </a:solidFill>
+                <a:latin typeface="Helvetica Light"/>
+                <a:sym typeface="Helvetica Light"/>
+              </a:rPr>
+              <a:t>Entrar</a:t>
+            </a:r>
+            <a:r>
+              <a:rPr lang="en-US" sz="1400" dirty="0">
+                <a:solidFill>
+                  <a:srgbClr val="000000"/>
+                </a:solidFill>
+                <a:latin typeface="Helvetica Light"/>
+                <a:sym typeface="Helvetica Light"/>
+              </a:rPr>
+              <a:t>" action="#{</a:t>
+            </a:r>
+            <a:r>
+              <a:rPr lang="en-US" sz="1400" dirty="0" err="1">
+                <a:solidFill>
+                  <a:srgbClr val="000000"/>
+                </a:solidFill>
+                <a:latin typeface="Helvetica Light"/>
+                <a:sym typeface="Helvetica Light"/>
+              </a:rPr>
+              <a:t>login.submit</a:t>
+            </a:r>
+            <a:r>
+              <a:rPr lang="en-US" sz="1400" dirty="0">
+                <a:solidFill>
+                  <a:srgbClr val="000000"/>
+                </a:solidFill>
+                <a:latin typeface="Helvetica Light"/>
+                <a:sym typeface="Helvetica Light"/>
+              </a:rPr>
+              <a:t>}“ /&gt;</a:t>
             </a:r>
           </a:p>
         </p:txBody>
@@ -11919,14 +12055,54 @@
           <a:p>
             <a:pPr defTabSz="409575" hangingPunct="0"/>
             <a:r>
-              <a:rPr lang="en-US" sz="1400">
+              <a:rPr lang="en-US" sz="1400" dirty="0">
                 <a:solidFill>
                   <a:srgbClr val="000000"/>
                 </a:solidFill>
                 <a:latin typeface="Helvetica Light"/>
                 <a:sym typeface="Helvetica Light"/>
               </a:rPr>
-              <a:t>&lt;h:commandButton value="Entrar" action=“login“ /&gt;</a:t>
+              <a:t>&lt;</a:t>
+            </a:r>
+            <a:r>
+              <a:rPr lang="en-US" sz="1400" dirty="0" err="1">
+                <a:solidFill>
+                  <a:srgbClr val="000000"/>
+                </a:solidFill>
+                <a:latin typeface="Helvetica Light"/>
+                <a:sym typeface="Helvetica Light"/>
+              </a:rPr>
+              <a:t>h:commandButton</a:t>
+            </a:r>
+            <a:r>
+              <a:rPr lang="en-US" sz="1400" dirty="0">
+                <a:solidFill>
+                  <a:srgbClr val="000000"/>
+                </a:solidFill>
+                <a:latin typeface="Helvetica Light"/>
+                <a:sym typeface="Helvetica Light"/>
+              </a:rPr>
+              <a:t> value="</a:t>
+            </a:r>
+            <a:r>
+              <a:rPr lang="en-US" sz="1400" dirty="0" err="1">
+                <a:solidFill>
+                  <a:srgbClr val="000000"/>
+                </a:solidFill>
+                <a:latin typeface="Helvetica Light"/>
+                <a:sym typeface="Helvetica Light"/>
+              </a:rPr>
+              <a:t>Entrar</a:t>
+            </a:r>
+            <a:r>
+              <a:rPr lang="en-US" sz="1400" dirty="0">
+                <a:solidFill>
+                  <a:srgbClr val="000000"/>
+                </a:solidFill>
+                <a:latin typeface="Helvetica Light"/>
+                <a:sym typeface="Helvetica Light"/>
+              </a:rPr>
+              <a:t>" action=“login“ /&gt;</a:t>
             </a:r>
           </a:p>
         </p:txBody>
@@ -12084,7 +12260,7 @@
               <a:t>SessionScope</a:t>
             </a:r>
             <a:r>
-              <a:rPr lang="es-ES"/>
+              <a:rPr lang="es-ES" dirty="0"/>
               <a:t>.</a:t>
             </a:r>
           </a:p>
@@ -12186,14 +12362,54 @@
           <a:p>
             <a:pPr defTabSz="409575" hangingPunct="0"/>
             <a:r>
-              <a:rPr lang="en-US" sz="1400">
+              <a:rPr lang="en-US" sz="1400" dirty="0">
                 <a:solidFill>
                   <a:srgbClr val="000000"/>
                 </a:solidFill>
                 <a:latin typeface="Helvetica Light"/>
                 <a:sym typeface="Helvetica Light"/>
               </a:rPr>
-              <a:t>&lt;h:commandButton label="Login" action"login?faces-redirect=true"/&gt;</a:t>
+              <a:t>&lt;</a:t>
+            </a:r>
+            <a:r>
+              <a:rPr lang="en-US" sz="1400" dirty="0" err="1">
+                <a:solidFill>
+                  <a:srgbClr val="000000"/>
+                </a:solidFill>
+                <a:latin typeface="Helvetica Light"/>
+                <a:sym typeface="Helvetica Light"/>
+              </a:rPr>
+              <a:t>h:commandButton</a:t>
+            </a:r>
+            <a:r>
+              <a:rPr lang="en-US" sz="1400" dirty="0">
+                <a:solidFill>
+                  <a:srgbClr val="000000"/>
+                </a:solidFill>
+                <a:latin typeface="Helvetica Light"/>
+                <a:sym typeface="Helvetica Light"/>
+              </a:rPr>
+              <a:t> label="Login" </a:t>
+            </a:r>
+            <a:r>
+              <a:rPr lang="en-US" sz="1400" dirty="0" err="1">
+                <a:solidFill>
+                  <a:srgbClr val="000000"/>
+                </a:solidFill>
+                <a:latin typeface="Helvetica Light"/>
+                <a:sym typeface="Helvetica Light"/>
+              </a:rPr>
+              <a:t>action"login?faces-redirect</a:t>
+            </a:r>
+            <a:r>
+              <a:rPr lang="en-US" sz="1400" dirty="0">
+                <a:solidFill>
+                  <a:srgbClr val="000000"/>
+                </a:solidFill>
+                <a:latin typeface="Helvetica Light"/>
+                <a:sym typeface="Helvetica Light"/>
+              </a:rPr>
+              <a:t>=true"/&gt;</a:t>
             </a:r>
           </a:p>
         </p:txBody>
@@ -12382,61 +12598,77 @@
           <a:lstStyle/>
           <a:p>
             <a:r>
-              <a:rPr lang="es-ES"/>
+              <a:rPr lang="es-ES" dirty="0"/>
               <a:t>Existe un componente que se encarga de resolver la vista a mostrar tras una petición, este componente se llama </a:t>
             </a:r>
             <a:r>
-              <a:rPr lang="es-ES" b="1"/>
+              <a:rPr lang="es-ES" b="1" dirty="0" err="1"/>
               <a:t>NavigationHandler</a:t>
             </a:r>
             <a:r>
-              <a:rPr lang="es-ES"/>
+              <a:rPr lang="es-ES" dirty="0"/>
               <a:t>.</a:t>
             </a:r>
           </a:p>
           <a:p>
-            <a:endParaRPr lang="es-ES"/>
-          </a:p>
-          <a:p>
-            <a:r>
-              <a:rPr lang="es-ES"/>
+            <a:endParaRPr lang="es-ES" dirty="0"/>
+          </a:p>
+          <a:p>
+            <a:r>
+              <a:rPr lang="es-ES" dirty="0"/>
               <a:t>Por defecto el </a:t>
             </a:r>
             <a:r>
-              <a:rPr lang="es-ES" b="1"/>
+              <a:rPr lang="es-ES" b="1" dirty="0" err="1"/>
               <a:t>NavigationHandler</a:t>
             </a:r>
             <a:r>
-              <a:rPr lang="es-ES"/>
-              <a:t> resolverá el String definido en el atributo </a:t>
-            </a:r>
-            <a:r>
-              <a:rPr lang="es-ES" b="1"/>
+              <a:rPr lang="es-ES" dirty="0"/>
+              <a:t> resolverá el </a:t>
+            </a:r>
+            <a:r>
+              <a:rPr lang="es-ES" dirty="0" err="1"/>
+              <a:t>String</a:t>
+            </a:r>
+            <a:r>
+              <a:rPr lang="es-ES" dirty="0"/>
+              <a:t> definido en el atributo </a:t>
+            </a:r>
+            <a:r>
+              <a:rPr lang="es-ES" b="1" dirty="0" err="1"/>
               <a:t>Action</a:t>
             </a:r>
             <a:r>
-              <a:rPr lang="es-ES"/>
-              <a:t> o el retornado por un método de Acción, como una url a partir de </a:t>
-            </a:r>
-            <a:r>
-              <a:rPr lang="es-ES" b="1"/>
-              <a:t>WebContent</a:t>
-            </a:r>
-            <a:r>
-              <a:rPr lang="es-ES"/>
+              <a:rPr lang="es-ES" dirty="0"/>
+              <a:t> o el retornado por un método de Acción, como una </a:t>
+            </a:r>
+            <a:r>
+              <a:rPr lang="es-ES" dirty="0" err="1"/>
+              <a:t>url</a:t>
+            </a:r>
+            <a:r>
+              <a:rPr lang="es-ES" dirty="0"/>
+              <a:t> a partir de </a:t>
+            </a:r>
+            <a:r>
+              <a:rPr lang="es-ES" b="1" dirty="0" err="1"/>
+              <a:t>webapp</a:t>
+            </a:r>
+            <a:r>
+              <a:rPr lang="es-ES" dirty="0"/>
               <a:t>, añadiendo la extensión </a:t>
             </a:r>
             <a:r>
-              <a:rPr lang="es-ES" b="1"/>
+              <a:rPr lang="es-ES" b="1" dirty="0" err="1"/>
               <a:t>xhtml</a:t>
             </a:r>
             <a:r>
-              <a:rPr lang="es-ES"/>
+              <a:rPr lang="es-ES" dirty="0"/>
               <a:t>.</a:t>
             </a:r>
           </a:p>
           <a:p>
-            <a:endParaRPr lang="es-ES"/>
+            <a:endParaRPr lang="es-ES" dirty="0"/>
           </a:p>
         </p:txBody>
       </p:sp>
@@ -12554,45 +12786,53 @@
           <a:lstStyle/>
           <a:p>
             <a:r>
-              <a:rPr lang="es-ES"/>
+              <a:rPr lang="es-ES" dirty="0"/>
               <a:t>También, se pueden definir reglas de navegación mas granulares en el fichero </a:t>
             </a:r>
             <a:r>
-              <a:rPr lang="es-ES" b="1"/>
+              <a:rPr lang="es-ES" b="1" dirty="0"/>
               <a:t>faces-config.xml</a:t>
             </a:r>
             <a:r>
-              <a:rPr lang="es-ES"/>
+              <a:rPr lang="es-ES" dirty="0"/>
               <a:t>.</a:t>
             </a:r>
           </a:p>
           <a:p>
-            <a:endParaRPr lang="es-ES"/>
-          </a:p>
-          <a:p>
-            <a:r>
-              <a:rPr lang="es-ES"/>
+            <a:endParaRPr lang="es-ES" dirty="0"/>
+          </a:p>
+          <a:p>
+            <a:r>
+              <a:rPr lang="es-ES" dirty="0"/>
               <a:t>Para ello se tienen los </a:t>
             </a:r>
             <a:r>
-              <a:rPr lang="es-ES" b="1"/>
-              <a:t>Navigation Case</a:t>
-            </a:r>
-            <a:r>
-              <a:rPr lang="es-ES"/>
+              <a:rPr lang="es-ES" b="1" dirty="0" err="1"/>
+              <a:t>Navigation</a:t>
+            </a:r>
+            <a:r>
+              <a:rPr lang="es-ES" b="1" dirty="0"/>
+              <a:t> Case</a:t>
+            </a:r>
+            <a:r>
+              <a:rPr lang="es-ES" dirty="0"/>
               <a:t> y los </a:t>
             </a:r>
             <a:r>
-              <a:rPr lang="es-ES" b="1"/>
-              <a:t>Navigation Rules</a:t>
-            </a:r>
-            <a:r>
-              <a:rPr lang="es-ES"/>
+              <a:rPr lang="es-ES" b="1" dirty="0" err="1"/>
+              <a:t>Navigation</a:t>
+            </a:r>
+            <a:r>
+              <a:rPr lang="es-ES" b="1" dirty="0"/>
+              <a:t> Rules</a:t>
+            </a:r>
+            <a:r>
+              <a:rPr lang="es-ES" dirty="0"/>
               <a:t>.</a:t>
             </a:r>
           </a:p>
           <a:p>
-            <a:endParaRPr lang="es-ES"/>
+            <a:endParaRPr lang="es-ES" dirty="0"/>
           </a:p>
         </p:txBody>
       </p:sp>

</xml_diff>